<commit_message>
Update all the slides
</commit_message>
<xml_diff>
--- a/2018/misc/intro.pptx
+++ b/2018/misc/intro.pptx
@@ -5,7 +5,7 @@
     <p:sldMasterId id="2147483648" r:id="rId1"/>
   </p:sldMasterIdLst>
   <p:notesMasterIdLst>
-    <p:notesMasterId r:id="rId16"/>
+    <p:notesMasterId r:id="rId15"/>
   </p:notesMasterIdLst>
   <p:sldIdLst>
     <p:sldId id="256" r:id="rId2"/>
@@ -15,13 +15,12 @@
     <p:sldId id="259" r:id="rId6"/>
     <p:sldId id="274" r:id="rId7"/>
     <p:sldId id="260" r:id="rId8"/>
-    <p:sldId id="264" r:id="rId9"/>
-    <p:sldId id="261" r:id="rId10"/>
-    <p:sldId id="267" r:id="rId11"/>
-    <p:sldId id="269" r:id="rId12"/>
-    <p:sldId id="263" r:id="rId13"/>
-    <p:sldId id="265" r:id="rId14"/>
-    <p:sldId id="262" r:id="rId15"/>
+    <p:sldId id="261" r:id="rId9"/>
+    <p:sldId id="267" r:id="rId10"/>
+    <p:sldId id="269" r:id="rId11"/>
+    <p:sldId id="263" r:id="rId12"/>
+    <p:sldId id="265" r:id="rId13"/>
+    <p:sldId id="262" r:id="rId14"/>
   </p:sldIdLst>
   <p:sldSz cx="13004800" cy="9753600"/>
   <p:notesSz cx="6858000" cy="9144000"/>
@@ -2619,27 +2618,35 @@
               <a:t>programming</a:t>
             </a:r>
             <a:r>
-              <a:rPr lang="en-US" sz="7200" cap="all" dirty="0" smtClean="0">
-                <a:solidFill>
-                  <a:srgbClr val="535353"/>
-                </a:solidFill>
-              </a:rPr>
-              <a:t>  -</a:t>
+              <a:rPr lang="en-US"/>
+              <a:t/>
             </a:r>
             <a:br>
-              <a:rPr lang="en-US" sz="7200" cap="all" dirty="0" smtClean="0">
-                <a:solidFill>
-                  <a:srgbClr val="535353"/>
-                </a:solidFill>
-              </a:rPr>
+              <a:rPr lang="en-US"/>
             </a:br>
             <a:r>
+              <a:rPr lang="en-US" sz="3500" cap="none" smtClean="0">
+                <a:solidFill>
+                  <a:srgbClr val="000000"/>
+                </a:solidFill>
+              </a:rPr>
+              <a:t>now with 50% more </a:t>
+            </a:r>
+            <a:r>
               <a:rPr lang="en-US" sz="3500" cap="none" dirty="0" smtClean="0">
                 <a:solidFill>
                   <a:srgbClr val="000000"/>
                 </a:solidFill>
               </a:rPr>
-              <a:t>Now with Python!</a:t>
+              <a:t>Python</a:t>
+            </a:r>
+            <a:r>
+              <a:rPr lang="en-US" sz="3500" cap="none" dirty="0" smtClean="0">
+                <a:solidFill>
+                  <a:srgbClr val="000000"/>
+                </a:solidFill>
+              </a:rPr>
+              <a:t>!</a:t>
             </a:r>
             <a:endParaRPr sz="3500" cap="all" dirty="0">
               <a:solidFill>
@@ -2680,7 +2687,7 @@
               </a:defRPr>
             </a:pPr>
             <a:r>
-              <a:rPr sz="3800">
+              <a:rPr sz="3800" dirty="0">
                 <a:solidFill>
                   <a:srgbClr val="535353"/>
                 </a:solidFill>
@@ -2688,7 +2695,7 @@
               <a:t>HILT </a:t>
             </a:r>
             <a:r>
-              <a:rPr sz="3800" smtClean="0">
+              <a:rPr sz="3800" dirty="0" smtClean="0">
                 <a:solidFill>
                   <a:srgbClr val="535353"/>
                 </a:solidFill>
@@ -2696,12 +2703,12 @@
               <a:t>20</a:t>
             </a:r>
             <a:r>
-              <a:rPr lang="en-US" sz="3800" smtClean="0">
-                <a:solidFill>
-                  <a:srgbClr val="535353"/>
-                </a:solidFill>
-              </a:rPr>
-              <a:t>18</a:t>
+              <a:rPr lang="en-US" sz="3800" dirty="0" smtClean="0">
+                <a:solidFill>
+                  <a:srgbClr val="535353"/>
+                </a:solidFill>
+              </a:rPr>
+              <a:t>19</a:t>
             </a:r>
             <a:endParaRPr sz="3800" dirty="0">
               <a:solidFill>
@@ -2746,7 +2753,7 @@
       </p:grpSpPr>
       <p:sp>
         <p:nvSpPr>
-          <p:cNvPr id="50" name="Shape 50"/>
+          <p:cNvPr id="2" name="Title 1"/>
           <p:cNvSpPr>
             <a:spLocks noGrp="1"/>
           </p:cNvSpPr>
@@ -2754,41 +2761,22 @@
             <p:ph type="title"/>
           </p:nvPr>
         </p:nvSpPr>
-        <p:spPr>
-          <a:prstGeom prst="rect">
-            <a:avLst/>
-          </a:prstGeom>
-        </p:spPr>
+        <p:spPr/>
         <p:txBody>
           <a:bodyPr/>
           <a:lstStyle/>
           <a:p>
-            <a:pPr lvl="0">
-              <a:defRPr sz="1800" cap="none">
-                <a:solidFill>
-                  <a:srgbClr val="000000"/>
-                </a:solidFill>
-              </a:defRPr>
-            </a:pPr>
-            <a:r>
-              <a:rPr lang="en-US" sz="7200" cap="all" dirty="0" smtClean="0">
-                <a:solidFill>
-                  <a:srgbClr val="535353"/>
-                </a:solidFill>
-              </a:rPr>
-              <a:t>Post-it Notes</a:t>
-            </a:r>
-            <a:endParaRPr sz="7200" cap="all" dirty="0">
-              <a:solidFill>
-                <a:srgbClr val="535353"/>
-              </a:solidFill>
-            </a:endParaRPr>
+            <a:r>
+              <a:rPr lang="en-US" dirty="0" smtClean="0"/>
+              <a:t>slack</a:t>
+            </a:r>
+            <a:endParaRPr lang="en-US" dirty="0"/>
           </a:p>
         </p:txBody>
       </p:sp>
       <p:sp>
         <p:nvSpPr>
-          <p:cNvPr id="51" name="Shape 51"/>
+          <p:cNvPr id="3" name="Text Placeholder 2"/>
           <p:cNvSpPr>
             <a:spLocks noGrp="1"/>
           </p:cNvSpPr>
@@ -2796,185 +2784,48 @@
             <p:ph type="body" idx="1"/>
           </p:nvPr>
         </p:nvSpPr>
-        <p:spPr>
-          <a:prstGeom prst="rect">
-            <a:avLst/>
-          </a:prstGeom>
-        </p:spPr>
+        <p:spPr/>
         <p:txBody>
-          <a:bodyPr>
-            <a:noAutofit/>
-          </a:bodyPr>
+          <a:bodyPr/>
           <a:lstStyle/>
           <a:p>
-            <a:pPr lvl="0">
-              <a:lnSpc>
-                <a:spcPct val="90000"/>
-              </a:lnSpc>
-              <a:defRPr sz="1800">
-                <a:solidFill>
-                  <a:srgbClr val="000000"/>
-                </a:solidFill>
-              </a:defRPr>
-            </a:pPr>
-            <a:r>
-              <a:rPr lang="en-US" sz="3600" dirty="0" smtClean="0">
-                <a:solidFill>
-                  <a:schemeClr val="tx1">
-                    <a:lumMod val="50000"/>
-                  </a:schemeClr>
-                </a:solidFill>
-              </a:rPr>
-              <a:t>All have three colors: Green, Red, White</a:t>
-            </a:r>
-            <a:endParaRPr sz="3600" dirty="0">
-              <a:solidFill>
-                <a:schemeClr val="tx1">
-                  <a:lumMod val="50000"/>
-                </a:schemeClr>
-              </a:solidFill>
-            </a:endParaRPr>
-          </a:p>
-          <a:p>
-            <a:pPr lvl="0">
-              <a:lnSpc>
-                <a:spcPct val="90000"/>
-              </a:lnSpc>
-              <a:defRPr sz="1800">
-                <a:solidFill>
-                  <a:srgbClr val="000000"/>
-                </a:solidFill>
-              </a:defRPr>
-            </a:pPr>
-            <a:r>
-              <a:rPr lang="en-US" sz="3600" dirty="0" smtClean="0">
-                <a:solidFill>
-                  <a:schemeClr val="tx1">
-                    <a:lumMod val="50000"/>
-                  </a:schemeClr>
-                </a:solidFill>
-              </a:rPr>
-              <a:t>Green: things are good</a:t>
-            </a:r>
-          </a:p>
-          <a:p>
-            <a:pPr lvl="0">
-              <a:lnSpc>
-                <a:spcPct val="90000"/>
-              </a:lnSpc>
-              <a:defRPr sz="1800">
-                <a:solidFill>
-                  <a:srgbClr val="000000"/>
-                </a:solidFill>
-              </a:defRPr>
-            </a:pPr>
-            <a:r>
-              <a:rPr lang="en-US" sz="3600" dirty="0" smtClean="0">
-                <a:solidFill>
-                  <a:schemeClr val="tx1">
-                    <a:lumMod val="50000"/>
-                  </a:schemeClr>
-                </a:solidFill>
-              </a:rPr>
-              <a:t>Red: need help</a:t>
-            </a:r>
-          </a:p>
-          <a:p>
-            <a:pPr lvl="0">
-              <a:lnSpc>
-                <a:spcPct val="90000"/>
-              </a:lnSpc>
-              <a:defRPr sz="1800">
-                <a:solidFill>
-                  <a:srgbClr val="000000"/>
-                </a:solidFill>
-              </a:defRPr>
-            </a:pPr>
-            <a:r>
-              <a:rPr lang="en-US" sz="3600" dirty="0" smtClean="0">
-                <a:solidFill>
-                  <a:schemeClr val="tx1">
-                    <a:lumMod val="50000"/>
-                  </a:schemeClr>
-                </a:solidFill>
-              </a:rPr>
-              <a:t>White: Done</a:t>
-            </a:r>
-          </a:p>
-          <a:p>
-            <a:pPr lvl="0">
-              <a:lnSpc>
-                <a:spcPct val="90000"/>
-              </a:lnSpc>
-              <a:defRPr sz="1800">
-                <a:solidFill>
-                  <a:srgbClr val="000000"/>
-                </a:solidFill>
-              </a:defRPr>
-            </a:pPr>
-            <a:r>
-              <a:rPr lang="en-US" sz="3600" dirty="0" smtClean="0">
-                <a:solidFill>
-                  <a:schemeClr val="tx1">
-                    <a:lumMod val="50000"/>
-                  </a:schemeClr>
-                </a:solidFill>
-              </a:rPr>
-              <a:t>Green and (especially) white offer help to red</a:t>
-            </a:r>
-            <a:endParaRPr sz="3600" dirty="0">
-              <a:solidFill>
-                <a:schemeClr val="tx1">
-                  <a:lumMod val="50000"/>
-                </a:schemeClr>
-              </a:solidFill>
-            </a:endParaRPr>
-          </a:p>
-          <a:p>
-            <a:pPr lvl="0">
-              <a:lnSpc>
-                <a:spcPct val="90000"/>
-              </a:lnSpc>
-              <a:defRPr sz="1800">
-                <a:solidFill>
-                  <a:srgbClr val="000000"/>
-                </a:solidFill>
-              </a:defRPr>
-            </a:pPr>
-            <a:r>
-              <a:rPr lang="en-US" sz="3600" dirty="0" smtClean="0">
-                <a:solidFill>
-                  <a:schemeClr val="tx1">
-                    <a:lumMod val="50000"/>
-                  </a:schemeClr>
-                </a:solidFill>
-              </a:rPr>
-              <a:t>Credit to Miriam Posner and Deb </a:t>
-            </a:r>
-            <a:r>
-              <a:rPr lang="en-US" sz="3600" dirty="0" err="1" smtClean="0">
-                <a:solidFill>
-                  <a:schemeClr val="tx1">
-                    <a:lumMod val="50000"/>
-                  </a:schemeClr>
-                </a:solidFill>
-              </a:rPr>
-              <a:t>Verhoeven</a:t>
-            </a:r>
-            <a:endParaRPr sz="3600" dirty="0">
-              <a:solidFill>
-                <a:schemeClr val="tx1">
-                  <a:lumMod val="50000"/>
-                </a:schemeClr>
-              </a:solidFill>
-            </a:endParaRPr>
+            <a:r>
+              <a:rPr lang="en-US" dirty="0" smtClean="0"/>
+              <a:t>hilt-</a:t>
+            </a:r>
+            <a:r>
+              <a:rPr lang="en-US" dirty="0" err="1" smtClean="0"/>
+              <a:t>institute.slack.com</a:t>
+            </a:r>
+            <a:endParaRPr lang="en-US" dirty="0" smtClean="0"/>
+          </a:p>
+          <a:p>
+            <a:r>
+              <a:rPr lang="en-US" dirty="0" smtClean="0"/>
+              <a:t>Another avenue for asking for help and sharing</a:t>
+            </a:r>
+          </a:p>
+          <a:p>
+            <a:r>
+              <a:rPr lang="en-US" dirty="0" smtClean="0"/>
+              <a:t>/</a:t>
+            </a:r>
+            <a:r>
+              <a:rPr lang="en-US" dirty="0" err="1" smtClean="0"/>
+              <a:t>giphy</a:t>
+            </a:r>
+            <a:r>
+              <a:rPr lang="en-US" dirty="0" smtClean="0"/>
+              <a:t> word</a:t>
+            </a:r>
+            <a:endParaRPr lang="en-US" dirty="0"/>
           </a:p>
         </p:txBody>
       </p:sp>
     </p:spTree>
     <p:extLst>
       <p:ext uri="{BB962C8B-B14F-4D97-AF65-F5344CB8AC3E}">
-        <p14:creationId xmlns:p14="http://schemas.microsoft.com/office/powerpoint/2010/main" val="3725044201"/>
+        <p14:creationId xmlns:p14="http://schemas.microsoft.com/office/powerpoint/2010/main" val="459141670"/>
       </p:ext>
     </p:extLst>
   </p:cSld>
@@ -3026,7 +2877,7 @@
           <a:p>
             <a:r>
               <a:rPr lang="en-US" dirty="0" smtClean="0"/>
-              <a:t>slack</a:t>
+              <a:t>Code of conduct</a:t>
             </a:r>
             <a:endParaRPr lang="en-US" dirty="0"/>
           </a:p>
@@ -3049,32 +2900,7 @@
           <a:p>
             <a:r>
               <a:rPr lang="en-US" dirty="0" smtClean="0"/>
-              <a:t>hilt-</a:t>
-            </a:r>
-            <a:r>
-              <a:rPr lang="en-US" dirty="0" err="1" smtClean="0"/>
-              <a:t>institute.slack.com</a:t>
-            </a:r>
-            <a:endParaRPr lang="en-US" dirty="0" smtClean="0"/>
-          </a:p>
-          <a:p>
-            <a:r>
-              <a:rPr lang="en-US" dirty="0" smtClean="0"/>
-              <a:t>Another avenue for asking for help and sharing</a:t>
-            </a:r>
-          </a:p>
-          <a:p>
-            <a:r>
-              <a:rPr lang="en-US" dirty="0" smtClean="0"/>
-              <a:t>/</a:t>
-            </a:r>
-            <a:r>
-              <a:rPr lang="en-US" dirty="0" err="1" smtClean="0"/>
-              <a:t>giphy</a:t>
-            </a:r>
-            <a:r>
-              <a:rPr lang="en-US" dirty="0" smtClean="0"/>
-              <a:t> word</a:t>
+              <a:t>We are dedicated to creating a safe, respectful, and collegial learning environment for the benefit of everyone who attends. </a:t>
             </a:r>
             <a:endParaRPr lang="en-US" dirty="0"/>
           </a:p>
@@ -3083,7 +2909,7 @@
     </p:spTree>
     <p:extLst>
       <p:ext uri="{BB962C8B-B14F-4D97-AF65-F5344CB8AC3E}">
-        <p14:creationId xmlns:p14="http://schemas.microsoft.com/office/powerpoint/2010/main" val="459141670"/>
+        <p14:creationId xmlns:p14="http://schemas.microsoft.com/office/powerpoint/2010/main" val="2729321658"/>
       </p:ext>
     </p:extLst>
   </p:cSld>
@@ -3135,90 +2961,6 @@
           <a:p>
             <a:r>
               <a:rPr lang="en-US" dirty="0" smtClean="0"/>
-              <a:t>Code of conduct</a:t>
-            </a:r>
-            <a:endParaRPr lang="en-US" dirty="0"/>
-          </a:p>
-        </p:txBody>
-      </p:sp>
-      <p:sp>
-        <p:nvSpPr>
-          <p:cNvPr id="3" name="Text Placeholder 2"/>
-          <p:cNvSpPr>
-            <a:spLocks noGrp="1"/>
-          </p:cNvSpPr>
-          <p:nvPr>
-            <p:ph type="body" idx="1"/>
-          </p:nvPr>
-        </p:nvSpPr>
-        <p:spPr/>
-        <p:txBody>
-          <a:bodyPr/>
-          <a:lstStyle/>
-          <a:p>
-            <a:r>
-              <a:rPr lang="en-US" dirty="0" smtClean="0"/>
-              <a:t>We are dedicated to creating a safe, respectful, and collegial learning environment for the benefit of everyone who attends. </a:t>
-            </a:r>
-            <a:endParaRPr lang="en-US" dirty="0"/>
-          </a:p>
-        </p:txBody>
-      </p:sp>
-    </p:spTree>
-    <p:extLst>
-      <p:ext uri="{BB962C8B-B14F-4D97-AF65-F5344CB8AC3E}">
-        <p14:creationId xmlns:p14="http://schemas.microsoft.com/office/powerpoint/2010/main" val="2729321658"/>
-      </p:ext>
-    </p:extLst>
-  </p:cSld>
-  <p:clrMapOvr>
-    <a:masterClrMapping/>
-  </p:clrMapOvr>
-  <p:transition xmlns:p14="http://schemas.microsoft.com/office/powerpoint/2010/main" spd="med"/>
-  <p:timing>
-    <p:tnLst>
-      <p:par>
-        <p:cTn xmlns:p14="http://schemas.microsoft.com/office/powerpoint/2010/main" id="1" dur="indefinite" restart="never" nodeType="tmRoot"/>
-      </p:par>
-    </p:tnLst>
-  </p:timing>
-</p:sld>
-</file>
-
-<file path=ppt/slides/slide13.xml><?xml version="1.0" encoding="utf-8"?>
-<p:sld xmlns:a="http://schemas.openxmlformats.org/drawingml/2006/main" xmlns:r="http://schemas.openxmlformats.org/officeDocument/2006/relationships" xmlns:p="http://schemas.openxmlformats.org/presentationml/2006/main">
-  <p:cSld>
-    <p:spTree>
-      <p:nvGrpSpPr>
-        <p:cNvPr id="1" name=""/>
-        <p:cNvGrpSpPr/>
-        <p:nvPr/>
-      </p:nvGrpSpPr>
-      <p:grpSpPr>
-        <a:xfrm>
-          <a:off x="0" y="0"/>
-          <a:ext cx="0" cy="0"/>
-          <a:chOff x="0" y="0"/>
-          <a:chExt cx="0" cy="0"/>
-        </a:xfrm>
-      </p:grpSpPr>
-      <p:sp>
-        <p:nvSpPr>
-          <p:cNvPr id="2" name="Title 1"/>
-          <p:cNvSpPr>
-            <a:spLocks noGrp="1"/>
-          </p:cNvSpPr>
-          <p:nvPr>
-            <p:ph type="title"/>
-          </p:nvPr>
-        </p:nvSpPr>
-        <p:spPr/>
-        <p:txBody>
-          <a:bodyPr/>
-          <a:lstStyle/>
-          <a:p>
-            <a:r>
-              <a:rPr lang="en-US" dirty="0" smtClean="0"/>
               <a:t>Other Important Stuff</a:t>
             </a:r>
             <a:endParaRPr lang="en-US" dirty="0"/>
@@ -3281,7 +3023,7 @@
 </p:sld>
 </file>
 
-<file path=ppt/slides/slide14.xml><?xml version="1.0" encoding="utf-8"?>
+<file path=ppt/slides/slide13.xml><?xml version="1.0" encoding="utf-8"?>
 <p:sld xmlns:a="http://schemas.openxmlformats.org/drawingml/2006/main" xmlns:r="http://schemas.openxmlformats.org/officeDocument/2006/relationships" xmlns:p="http://schemas.openxmlformats.org/presentationml/2006/main">
   <p:cSld>
     <p:spTree>
@@ -4625,7 +4367,7 @@
       </p:grpSpPr>
       <p:sp>
         <p:nvSpPr>
-          <p:cNvPr id="2" name="Title 1"/>
+          <p:cNvPr id="50" name="Shape 50"/>
           <p:cNvSpPr>
             <a:spLocks noGrp="1"/>
           </p:cNvSpPr>
@@ -4633,22 +4375,36 @@
             <p:ph type="title"/>
           </p:nvPr>
         </p:nvSpPr>
-        <p:spPr/>
+        <p:spPr>
+          <a:prstGeom prst="rect">
+            <a:avLst/>
+          </a:prstGeom>
+        </p:spPr>
         <p:txBody>
           <a:bodyPr/>
           <a:lstStyle/>
           <a:p>
-            <a:r>
-              <a:rPr lang="en-US" dirty="0" smtClean="0"/>
-              <a:t>No Seriously…</a:t>
-            </a:r>
-            <a:endParaRPr lang="en-US" dirty="0"/>
+            <a:pPr lvl="0">
+              <a:defRPr sz="1800" cap="none">
+                <a:solidFill>
+                  <a:srgbClr val="000000"/>
+                </a:solidFill>
+              </a:defRPr>
+            </a:pPr>
+            <a:r>
+              <a:rPr sz="7200" cap="all">
+                <a:solidFill>
+                  <a:srgbClr val="535353"/>
+                </a:solidFill>
+              </a:rPr>
+              <a:t>Ground Rules</a:t>
+            </a:r>
           </a:p>
         </p:txBody>
       </p:sp>
       <p:sp>
         <p:nvSpPr>
-          <p:cNvPr id="3" name="Text Placeholder 2"/>
+          <p:cNvPr id="51" name="Shape 51"/>
           <p:cNvSpPr>
             <a:spLocks noGrp="1"/>
           </p:cNvSpPr>
@@ -4656,57 +4412,97 @@
             <p:ph type="body" idx="1"/>
           </p:nvPr>
         </p:nvSpPr>
-        <p:spPr/>
+        <p:spPr>
+          <a:prstGeom prst="rect">
+            <a:avLst/>
+          </a:prstGeom>
+        </p:spPr>
         <p:txBody>
           <a:bodyPr/>
           <a:lstStyle/>
           <a:p>
-            <a:r>
-              <a:rPr lang="en-US" dirty="0" smtClean="0"/>
-              <a:t>Take a walk</a:t>
-            </a:r>
-          </a:p>
-          <a:p>
-            <a:r>
-              <a:rPr lang="en-US" dirty="0" smtClean="0"/>
-              <a:t>Browse </a:t>
-            </a:r>
-            <a:r>
-              <a:rPr lang="en-US" dirty="0" err="1" smtClean="0"/>
-              <a:t>reddit</a:t>
-            </a:r>
-            <a:r>
-              <a:rPr lang="en-US" dirty="0"/>
-              <a:t> </a:t>
-            </a:r>
-            <a:r>
-              <a:rPr lang="en-US" dirty="0" smtClean="0"/>
-              <a:t>(/r/</a:t>
-            </a:r>
-            <a:r>
-              <a:rPr lang="en-US" dirty="0" err="1" smtClean="0"/>
-              <a:t>aww</a:t>
-            </a:r>
-            <a:r>
-              <a:rPr lang="en-US" dirty="0" smtClean="0"/>
-              <a:t>)</a:t>
-            </a:r>
-          </a:p>
-          <a:p>
-            <a:r>
-              <a:rPr lang="en-US" dirty="0" smtClean="0"/>
-              <a:t>Play a game…Brandon loves icebreakers</a:t>
-            </a:r>
-            <a:endParaRPr lang="en-US" dirty="0"/>
+            <a:pPr lvl="0">
+              <a:defRPr sz="1800">
+                <a:solidFill>
+                  <a:srgbClr val="000000"/>
+                </a:solidFill>
+              </a:defRPr>
+            </a:pPr>
+            <a:r>
+              <a:rPr sz="4600" dirty="0">
+                <a:solidFill>
+                  <a:srgbClr val="535353"/>
+                </a:solidFill>
+              </a:rPr>
+              <a:t>Asking questions is a “super power”</a:t>
+            </a:r>
+          </a:p>
+          <a:p>
+            <a:pPr lvl="0">
+              <a:defRPr sz="1800">
+                <a:solidFill>
+                  <a:srgbClr val="000000"/>
+                </a:solidFill>
+              </a:defRPr>
+            </a:pPr>
+            <a:r>
+              <a:rPr sz="4600" dirty="0">
+                <a:solidFill>
+                  <a:srgbClr val="535353"/>
+                </a:solidFill>
+              </a:rPr>
+              <a:t>If you need a mental (or other break), take one</a:t>
+            </a:r>
+          </a:p>
+          <a:p>
+            <a:pPr lvl="0">
+              <a:defRPr sz="1800">
+                <a:solidFill>
+                  <a:srgbClr val="000000"/>
+                </a:solidFill>
+              </a:defRPr>
+            </a:pPr>
+            <a:r>
+              <a:rPr lang="en-US" sz="4600" dirty="0" smtClean="0">
+                <a:solidFill>
+                  <a:srgbClr val="535353"/>
+                </a:solidFill>
+              </a:rPr>
+              <a:t>Writing software </a:t>
+            </a:r>
+            <a:r>
+              <a:rPr sz="4600" dirty="0" smtClean="0">
+                <a:solidFill>
+                  <a:srgbClr val="535353"/>
+                </a:solidFill>
+              </a:rPr>
+              <a:t>is </a:t>
+            </a:r>
+            <a:r>
+              <a:rPr sz="4600" dirty="0">
+                <a:solidFill>
+                  <a:srgbClr val="535353"/>
+                </a:solidFill>
+              </a:rPr>
+              <a:t>a </a:t>
+            </a:r>
+            <a:r>
+              <a:rPr lang="en-US" sz="4600" dirty="0" smtClean="0">
+                <a:solidFill>
+                  <a:srgbClr val="535353"/>
+                </a:solidFill>
+              </a:rPr>
+              <a:t>collaborative endeavor</a:t>
+            </a:r>
+            <a:endParaRPr sz="4600" dirty="0">
+              <a:solidFill>
+                <a:srgbClr val="535353"/>
+              </a:solidFill>
+            </a:endParaRPr>
           </a:p>
         </p:txBody>
       </p:sp>
     </p:spTree>
-    <p:extLst>
-      <p:ext uri="{BB962C8B-B14F-4D97-AF65-F5344CB8AC3E}">
-        <p14:creationId xmlns:p14="http://schemas.microsoft.com/office/powerpoint/2010/main" val="747440101"/>
-      </p:ext>
-    </p:extLst>
   </p:cSld>
   <p:clrMapOvr>
     <a:masterClrMapping/>
@@ -4766,13 +4562,18 @@
               </a:defRPr>
             </a:pPr>
             <a:r>
-              <a:rPr sz="7200" cap="all">
-                <a:solidFill>
-                  <a:srgbClr val="535353"/>
-                </a:solidFill>
-              </a:rPr>
-              <a:t>Ground Rules</a:t>
-            </a:r>
+              <a:rPr lang="en-US" sz="7200" cap="all" dirty="0" smtClean="0">
+                <a:solidFill>
+                  <a:srgbClr val="535353"/>
+                </a:solidFill>
+              </a:rPr>
+              <a:t>Post-it Notes</a:t>
+            </a:r>
+            <a:endParaRPr sz="7200" cap="all" dirty="0">
+              <a:solidFill>
+                <a:srgbClr val="535353"/>
+              </a:solidFill>
+            </a:endParaRPr>
           </a:p>
         </p:txBody>
       </p:sp>
@@ -4792,10 +4593,15 @@
           </a:prstGeom>
         </p:spPr>
         <p:txBody>
-          <a:bodyPr/>
+          <a:bodyPr>
+            <a:noAutofit/>
+          </a:bodyPr>
           <a:lstStyle/>
           <a:p>
             <a:pPr lvl="0">
+              <a:lnSpc>
+                <a:spcPct val="90000"/>
+              </a:lnSpc>
               <a:defRPr sz="1800">
                 <a:solidFill>
                   <a:srgbClr val="000000"/>
@@ -4803,16 +4609,28 @@
               </a:defRPr>
             </a:pPr>
             <a:r>
-              <a:rPr sz="4600" dirty="0">
-                <a:solidFill>
-                  <a:srgbClr val="535353"/>
-                </a:solidFill>
-              </a:rPr>
-              <a:t>Asking questions is a “super power”</a:t>
-            </a:r>
+              <a:rPr lang="en-US" sz="3600" dirty="0" smtClean="0">
+                <a:solidFill>
+                  <a:schemeClr val="tx1">
+                    <a:lumMod val="50000"/>
+                  </a:schemeClr>
+                </a:solidFill>
+              </a:rPr>
+              <a:t>All have three colors: Green, Red, White</a:t>
+            </a:r>
+            <a:endParaRPr sz="3600" dirty="0">
+              <a:solidFill>
+                <a:schemeClr val="tx1">
+                  <a:lumMod val="50000"/>
+                </a:schemeClr>
+              </a:solidFill>
+            </a:endParaRPr>
           </a:p>
           <a:p>
             <a:pPr lvl="0">
+              <a:lnSpc>
+                <a:spcPct val="90000"/>
+              </a:lnSpc>
               <a:defRPr sz="1800">
                 <a:solidFill>
                   <a:srgbClr val="000000"/>
@@ -4820,16 +4638,21 @@
               </a:defRPr>
             </a:pPr>
             <a:r>
-              <a:rPr sz="4600" dirty="0">
-                <a:solidFill>
-                  <a:srgbClr val="535353"/>
-                </a:solidFill>
-              </a:rPr>
-              <a:t>If you need a mental (or other break), take one</a:t>
+              <a:rPr lang="en-US" sz="3600" dirty="0" smtClean="0">
+                <a:solidFill>
+                  <a:schemeClr val="tx1">
+                    <a:lumMod val="50000"/>
+                  </a:schemeClr>
+                </a:solidFill>
+              </a:rPr>
+              <a:t>Green: things are good</a:t>
             </a:r>
           </a:p>
           <a:p>
             <a:pPr lvl="0">
+              <a:lnSpc>
+                <a:spcPct val="90000"/>
+              </a:lnSpc>
               <a:defRPr sz="1800">
                 <a:solidFill>
                   <a:srgbClr val="000000"/>
@@ -4837,46 +4660,114 @@
               </a:defRPr>
             </a:pPr>
             <a:r>
-              <a:rPr lang="en-US" sz="4600" dirty="0" smtClean="0">
-                <a:solidFill>
-                  <a:srgbClr val="535353"/>
-                </a:solidFill>
-              </a:rPr>
-              <a:t>Writing software </a:t>
-            </a:r>
-            <a:r>
-              <a:rPr sz="4600" dirty="0" smtClean="0">
-                <a:solidFill>
-                  <a:srgbClr val="535353"/>
-                </a:solidFill>
-              </a:rPr>
-              <a:t>is </a:t>
-            </a:r>
-            <a:r>
-              <a:rPr sz="4600" dirty="0">
-                <a:solidFill>
-                  <a:srgbClr val="535353"/>
-                </a:solidFill>
-              </a:rPr>
-              <a:t>a </a:t>
-            </a:r>
-            <a:r>
-              <a:rPr lang="en-US" sz="4600" dirty="0" smtClean="0">
-                <a:solidFill>
-                  <a:srgbClr val="535353"/>
-                </a:solidFill>
-              </a:rPr>
-              <a:t>collaborative endeavor</a:t>
-            </a:r>
-            <a:endParaRPr sz="4600" dirty="0">
+              <a:rPr lang="en-US" sz="3600" dirty="0" smtClean="0">
+                <a:solidFill>
+                  <a:schemeClr val="tx1">
+                    <a:lumMod val="50000"/>
+                  </a:schemeClr>
+                </a:solidFill>
+              </a:rPr>
+              <a:t>Red: need help</a:t>
+            </a:r>
+          </a:p>
+          <a:p>
+            <a:pPr lvl="0">
+              <a:lnSpc>
+                <a:spcPct val="90000"/>
+              </a:lnSpc>
+              <a:defRPr sz="1800">
+                <a:solidFill>
+                  <a:srgbClr val="000000"/>
+                </a:solidFill>
+              </a:defRPr>
+            </a:pPr>
+            <a:r>
+              <a:rPr lang="en-US" sz="3600" dirty="0" smtClean="0">
+                <a:solidFill>
+                  <a:schemeClr val="tx1">
+                    <a:lumMod val="50000"/>
+                  </a:schemeClr>
+                </a:solidFill>
+              </a:rPr>
+              <a:t>White: Done</a:t>
+            </a:r>
+          </a:p>
+          <a:p>
+            <a:pPr lvl="0">
+              <a:lnSpc>
+                <a:spcPct val="90000"/>
+              </a:lnSpc>
+              <a:defRPr sz="1800">
+                <a:solidFill>
+                  <a:srgbClr val="000000"/>
+                </a:solidFill>
+              </a:defRPr>
+            </a:pPr>
+            <a:r>
+              <a:rPr lang="en-US" sz="3600" dirty="0" smtClean="0">
+                <a:solidFill>
+                  <a:schemeClr val="tx1">
+                    <a:lumMod val="50000"/>
+                  </a:schemeClr>
+                </a:solidFill>
+              </a:rPr>
+              <a:t>Green and (especially) white offer help to red</a:t>
+            </a:r>
+            <a:endParaRPr sz="3600" dirty="0">
               <a:solidFill>
-                <a:srgbClr val="535353"/>
+                <a:schemeClr val="tx1">
+                  <a:lumMod val="50000"/>
+                </a:schemeClr>
+              </a:solidFill>
+            </a:endParaRPr>
+          </a:p>
+          <a:p>
+            <a:pPr lvl="0">
+              <a:lnSpc>
+                <a:spcPct val="90000"/>
+              </a:lnSpc>
+              <a:defRPr sz="1800">
+                <a:solidFill>
+                  <a:srgbClr val="000000"/>
+                </a:solidFill>
+              </a:defRPr>
+            </a:pPr>
+            <a:r>
+              <a:rPr lang="en-US" sz="3600" dirty="0" smtClean="0">
+                <a:solidFill>
+                  <a:schemeClr val="tx1">
+                    <a:lumMod val="50000"/>
+                  </a:schemeClr>
+                </a:solidFill>
+              </a:rPr>
+              <a:t>Credit to Miriam Posner and Deb </a:t>
+            </a:r>
+            <a:r>
+              <a:rPr lang="en-US" sz="3600" dirty="0" err="1" smtClean="0">
+                <a:solidFill>
+                  <a:schemeClr val="tx1">
+                    <a:lumMod val="50000"/>
+                  </a:schemeClr>
+                </a:solidFill>
+              </a:rPr>
+              <a:t>Verhoeven</a:t>
+            </a:r>
+            <a:endParaRPr sz="3600" dirty="0">
+              <a:solidFill>
+                <a:schemeClr val="tx1">
+                  <a:lumMod val="50000"/>
+                </a:schemeClr>
               </a:solidFill>
             </a:endParaRPr>
           </a:p>
         </p:txBody>
       </p:sp>
     </p:spTree>
+    <p:extLst>
+      <p:ext uri="{BB962C8B-B14F-4D97-AF65-F5344CB8AC3E}">
+        <p14:creationId xmlns:p14="http://schemas.microsoft.com/office/powerpoint/2010/main" val="3725044201"/>
+      </p:ext>
+    </p:extLst>
   </p:cSld>
   <p:clrMapOvr>
     <a:masterClrMapping/>

</xml_diff>